<commit_message>
Update URL and email address
</commit_message>
<xml_diff>
--- a/svlib/doc/163-aq602-draft2.pptx
+++ b/svlib/doc/163-aq602-draft2.pptx
@@ -217,7 +217,7 @@
             <a:fld id="{4CCD0033-5F2B-446E-B3A5-D3C3D848D8F7}" type="datetimeFigureOut">
               <a:rPr lang="en-GB" smtClean="0"/>
               <a:pPr/>
-              <a:t>02/02/2014</a:t>
+              <a:t>03/02/2014</a:t>
             </a:fld>
             <a:endParaRPr lang="en-GB"/>
           </a:p>
@@ -1136,7 +1136,7 @@
     </p:spTree>
     <p:extLst>
       <p:ext uri="{BB962C8B-B14F-4D97-AF65-F5344CB8AC3E}">
-        <p14:creationId xmlns="" xmlns:p14="http://schemas.microsoft.com/office/powerpoint/2010/main" val="989869968"/>
+        <p14:creationId xmlns:p14="http://schemas.microsoft.com/office/powerpoint/2010/main" xmlns="" val="989869968"/>
       </p:ext>
     </p:extLst>
   </p:cSld>
@@ -1272,7 +1272,7 @@
             <a:fld id="{1736D410-BB1B-47BE-81F8-FA61DEEC5942}" type="datetimeFigureOut">
               <a:rPr lang="en-US" smtClean="0"/>
               <a:pPr/>
-              <a:t>2/2/2014</a:t>
+              <a:t>2/3/2014</a:t>
             </a:fld>
             <a:endParaRPr lang="en-US"/>
           </a:p>
@@ -1324,7 +1324,7 @@
     </p:spTree>
     <p:extLst>
       <p:ext uri="{BB962C8B-B14F-4D97-AF65-F5344CB8AC3E}">
-        <p14:creationId xmlns="" xmlns:p14="http://schemas.microsoft.com/office/powerpoint/2010/main" val="1452775338"/>
+        <p14:creationId xmlns:p14="http://schemas.microsoft.com/office/powerpoint/2010/main" xmlns="" val="1452775338"/>
       </p:ext>
     </p:extLst>
   </p:cSld>
@@ -1460,7 +1460,7 @@
             <a:fld id="{1736D410-BB1B-47BE-81F8-FA61DEEC5942}" type="datetimeFigureOut">
               <a:rPr lang="en-US" smtClean="0"/>
               <a:pPr/>
-              <a:t>2/2/2014</a:t>
+              <a:t>2/3/2014</a:t>
             </a:fld>
             <a:endParaRPr lang="en-US"/>
           </a:p>
@@ -1512,7 +1512,7 @@
     </p:spTree>
     <p:extLst>
       <p:ext uri="{BB962C8B-B14F-4D97-AF65-F5344CB8AC3E}">
-        <p14:creationId xmlns="" xmlns:p14="http://schemas.microsoft.com/office/powerpoint/2010/main" val="3894337954"/>
+        <p14:creationId xmlns:p14="http://schemas.microsoft.com/office/powerpoint/2010/main" xmlns="" val="3894337954"/>
       </p:ext>
     </p:extLst>
   </p:cSld>
@@ -1710,7 +1710,7 @@
             <a:fld id="{1736D410-BB1B-47BE-81F8-FA61DEEC5942}" type="datetimeFigureOut">
               <a:rPr lang="en-US" smtClean="0"/>
               <a:pPr/>
-              <a:t>2/2/2014</a:t>
+              <a:t>2/3/2014</a:t>
             </a:fld>
             <a:endParaRPr lang="en-US"/>
           </a:p>
@@ -1762,7 +1762,7 @@
     </p:spTree>
     <p:extLst>
       <p:ext uri="{BB962C8B-B14F-4D97-AF65-F5344CB8AC3E}">
-        <p14:creationId xmlns="" xmlns:p14="http://schemas.microsoft.com/office/powerpoint/2010/main" val="1362160421"/>
+        <p14:creationId xmlns:p14="http://schemas.microsoft.com/office/powerpoint/2010/main" xmlns="" val="1362160421"/>
       </p:ext>
     </p:extLst>
   </p:cSld>
@@ -1898,7 +1898,7 @@
             <a:fld id="{1736D410-BB1B-47BE-81F8-FA61DEEC5942}" type="datetimeFigureOut">
               <a:rPr lang="en-US" smtClean="0"/>
               <a:pPr/>
-              <a:t>2/2/2014</a:t>
+              <a:t>2/3/2014</a:t>
             </a:fld>
             <a:endParaRPr lang="en-US"/>
           </a:p>
@@ -1950,7 +1950,7 @@
     </p:spTree>
     <p:extLst>
       <p:ext uri="{BB962C8B-B14F-4D97-AF65-F5344CB8AC3E}">
-        <p14:creationId xmlns="" xmlns:p14="http://schemas.microsoft.com/office/powerpoint/2010/main" val="1001508708"/>
+        <p14:creationId xmlns:p14="http://schemas.microsoft.com/office/powerpoint/2010/main" xmlns="" val="1001508708"/>
       </p:ext>
     </p:extLst>
   </p:cSld>
@@ -2152,7 +2152,7 @@
             <a:fld id="{1736D410-BB1B-47BE-81F8-FA61DEEC5942}" type="datetimeFigureOut">
               <a:rPr lang="en-US" smtClean="0"/>
               <a:pPr/>
-              <a:t>2/2/2014</a:t>
+              <a:t>2/3/2014</a:t>
             </a:fld>
             <a:endParaRPr lang="en-US"/>
           </a:p>
@@ -2204,7 +2204,7 @@
     </p:spTree>
     <p:extLst>
       <p:ext uri="{BB962C8B-B14F-4D97-AF65-F5344CB8AC3E}">
-        <p14:creationId xmlns="" xmlns:p14="http://schemas.microsoft.com/office/powerpoint/2010/main" val="3465844944"/>
+        <p14:creationId xmlns:p14="http://schemas.microsoft.com/office/powerpoint/2010/main" xmlns="" val="3465844944"/>
       </p:ext>
     </p:extLst>
   </p:cSld>
@@ -2456,7 +2456,7 @@
             <a:fld id="{1736D410-BB1B-47BE-81F8-FA61DEEC5942}" type="datetimeFigureOut">
               <a:rPr lang="en-US" smtClean="0"/>
               <a:pPr/>
-              <a:t>2/2/2014</a:t>
+              <a:t>2/3/2014</a:t>
             </a:fld>
             <a:endParaRPr lang="en-US"/>
           </a:p>
@@ -2508,7 +2508,7 @@
     </p:spTree>
     <p:extLst>
       <p:ext uri="{BB962C8B-B14F-4D97-AF65-F5344CB8AC3E}">
-        <p14:creationId xmlns="" xmlns:p14="http://schemas.microsoft.com/office/powerpoint/2010/main" val="3500538590"/>
+        <p14:creationId xmlns:p14="http://schemas.microsoft.com/office/powerpoint/2010/main" xmlns="" val="3500538590"/>
       </p:ext>
     </p:extLst>
   </p:cSld>
@@ -2900,7 +2900,7 @@
             <a:fld id="{1736D410-BB1B-47BE-81F8-FA61DEEC5942}" type="datetimeFigureOut">
               <a:rPr lang="en-US" smtClean="0"/>
               <a:pPr/>
-              <a:t>2/2/2014</a:t>
+              <a:t>2/3/2014</a:t>
             </a:fld>
             <a:endParaRPr lang="en-US"/>
           </a:p>
@@ -2952,7 +2952,7 @@
     </p:spTree>
     <p:extLst>
       <p:ext uri="{BB962C8B-B14F-4D97-AF65-F5344CB8AC3E}">
-        <p14:creationId xmlns="" xmlns:p14="http://schemas.microsoft.com/office/powerpoint/2010/main" val="1822163244"/>
+        <p14:creationId xmlns:p14="http://schemas.microsoft.com/office/powerpoint/2010/main" xmlns="" val="1822163244"/>
       </p:ext>
     </p:extLst>
   </p:cSld>
@@ -2997,7 +2997,7 @@
             <a:fld id="{1736D410-BB1B-47BE-81F8-FA61DEEC5942}" type="datetimeFigureOut">
               <a:rPr lang="en-US" smtClean="0"/>
               <a:pPr/>
-              <a:t>2/2/2014</a:t>
+              <a:t>2/3/2014</a:t>
             </a:fld>
             <a:endParaRPr lang="en-US"/>
           </a:p>
@@ -3049,7 +3049,7 @@
     </p:spTree>
     <p:extLst>
       <p:ext uri="{BB962C8B-B14F-4D97-AF65-F5344CB8AC3E}">
-        <p14:creationId xmlns="" xmlns:p14="http://schemas.microsoft.com/office/powerpoint/2010/main" val="2405767068"/>
+        <p14:creationId xmlns:p14="http://schemas.microsoft.com/office/powerpoint/2010/main" xmlns="" val="2405767068"/>
       </p:ext>
     </p:extLst>
   </p:cSld>
@@ -3285,7 +3285,7 @@
             <a:fld id="{1736D410-BB1B-47BE-81F8-FA61DEEC5942}" type="datetimeFigureOut">
               <a:rPr lang="en-US" smtClean="0"/>
               <a:pPr/>
-              <a:t>2/2/2014</a:t>
+              <a:t>2/3/2014</a:t>
             </a:fld>
             <a:endParaRPr lang="en-US"/>
           </a:p>
@@ -3337,7 +3337,7 @@
     </p:spTree>
     <p:extLst>
       <p:ext uri="{BB962C8B-B14F-4D97-AF65-F5344CB8AC3E}">
-        <p14:creationId xmlns="" xmlns:p14="http://schemas.microsoft.com/office/powerpoint/2010/main" val="1001517974"/>
+        <p14:creationId xmlns:p14="http://schemas.microsoft.com/office/powerpoint/2010/main" xmlns="" val="1001517974"/>
       </p:ext>
     </p:extLst>
   </p:cSld>
@@ -3549,7 +3549,7 @@
             <a:fld id="{1736D410-BB1B-47BE-81F8-FA61DEEC5942}" type="datetimeFigureOut">
               <a:rPr lang="en-US" smtClean="0"/>
               <a:pPr/>
-              <a:t>2/2/2014</a:t>
+              <a:t>2/3/2014</a:t>
             </a:fld>
             <a:endParaRPr lang="en-US"/>
           </a:p>
@@ -3601,7 +3601,7 @@
     </p:spTree>
     <p:extLst>
       <p:ext uri="{BB962C8B-B14F-4D97-AF65-F5344CB8AC3E}">
-        <p14:creationId xmlns="" xmlns:p14="http://schemas.microsoft.com/office/powerpoint/2010/main" val="1032843098"/>
+        <p14:creationId xmlns:p14="http://schemas.microsoft.com/office/powerpoint/2010/main" xmlns="" val="1032843098"/>
       </p:ext>
     </p:extLst>
   </p:cSld>
@@ -3678,7 +3678,7 @@
             <a:fld id="{1736D410-BB1B-47BE-81F8-FA61DEEC5942}" type="datetimeFigureOut">
               <a:rPr lang="en-US" smtClean="0"/>
               <a:pPr/>
-              <a:t>2/2/2014</a:t>
+              <a:t>2/3/2014</a:t>
             </a:fld>
             <a:endParaRPr lang="en-US"/>
           </a:p>
@@ -3761,7 +3761,7 @@
     </p:spTree>
     <p:extLst>
       <p:ext uri="{BB962C8B-B14F-4D97-AF65-F5344CB8AC3E}">
-        <p14:creationId xmlns="" xmlns:p14="http://schemas.microsoft.com/office/powerpoint/2010/main" val="2425591320"/>
+        <p14:creationId xmlns:p14="http://schemas.microsoft.com/office/powerpoint/2010/main" xmlns="" val="2425591320"/>
       </p:ext>
     </p:extLst>
   </p:cSld>
@@ -4178,7 +4178,7 @@
     </p:spTree>
     <p:extLst>
       <p:ext uri="{BB962C8B-B14F-4D97-AF65-F5344CB8AC3E}">
-        <p14:creationId xmlns="" xmlns:p14="http://schemas.microsoft.com/office/powerpoint/2010/main" val="3983013449"/>
+        <p14:creationId xmlns:p14="http://schemas.microsoft.com/office/powerpoint/2010/main" xmlns="" val="3983013449"/>
       </p:ext>
     </p:extLst>
   </p:cSld>
@@ -7135,7 +7135,28 @@
               <a:rPr lang="en-GB" sz="2800" smtClean="0">
                 <a:cs typeface="Courier New" pitchFamily="49" charset="0"/>
               </a:rPr>
-              <a:t>www.verilab.com/resources/svlib</a:t>
+              <a:t>www.verilab.com/resources</a:t>
+            </a:r>
+          </a:p>
+          <a:p>
+            <a:pPr algn="ctr"/>
+            <a:r>
+              <a:rPr lang="en-GB" sz="2800" smtClean="0">
+                <a:cs typeface="Courier New" pitchFamily="49" charset="0"/>
+              </a:rPr>
+              <a:t>- follow the </a:t>
+            </a:r>
+            <a:r>
+              <a:rPr lang="en-GB" sz="2800" b="1" smtClean="0">
+                <a:cs typeface="Courier New" pitchFamily="49" charset="0"/>
+              </a:rPr>
+              <a:t>svlib</a:t>
+            </a:r>
+            <a:r>
+              <a:rPr lang="en-GB" sz="2800" smtClean="0">
+                <a:cs typeface="Courier New" pitchFamily="49" charset="0"/>
+              </a:rPr>
+              <a:t> link</a:t>
             </a:r>
             <a:endParaRPr lang="en-GB" sz="2800"/>
           </a:p>
@@ -7149,8 +7170,8 @@
         </p:nvSpPr>
         <p:spPr>
           <a:xfrm>
-            <a:off x="4419600" y="3276600"/>
-            <a:ext cx="4419600" cy="838200"/>
+            <a:off x="4572000" y="3429000"/>
+            <a:ext cx="3505200" cy="533400"/>
           </a:xfrm>
           <a:prstGeom prst="roundRect">
             <a:avLst>
@@ -7186,16 +7207,7 @@
               <a:rPr lang="en-GB" sz="2400" smtClean="0">
                 <a:cs typeface="Courier New" pitchFamily="49" charset="0"/>
               </a:rPr>
-              <a:t>jonathan.bromley@verilab.com</a:t>
-            </a:r>
-          </a:p>
-          <a:p>
-            <a:pPr algn="ctr"/>
-            <a:r>
-              <a:rPr lang="en-GB" sz="2400" smtClean="0">
-                <a:cs typeface="Courier New" pitchFamily="49" charset="0"/>
-              </a:rPr>
-              <a:t>andre.winkelmann@verilab.com</a:t>
+              <a:t>svlib@verilab.com</a:t>
             </a:r>
             <a:endParaRPr lang="en-GB" sz="2400"/>
           </a:p>

</xml_diff>

<commit_message>
Scan through the draft slides and make a few minor changes
</commit_message>
<xml_diff>
--- a/svlib/doc/163-aq602-draft2.pptx
+++ b/svlib/doc/163-aq602-draft2.pptx
@@ -217,7 +217,7 @@
             <a:fld id="{4CCD0033-5F2B-446E-B3A5-D3C3D848D8F7}" type="datetimeFigureOut">
               <a:rPr lang="en-GB" smtClean="0"/>
               <a:pPr/>
-              <a:t>03/02/2014</a:t>
+              <a:t>16/02/2014</a:t>
             </a:fld>
             <a:endParaRPr lang="en-GB"/>
           </a:p>
@@ -1136,7 +1136,7 @@
     </p:spTree>
     <p:extLst>
       <p:ext uri="{BB962C8B-B14F-4D97-AF65-F5344CB8AC3E}">
-        <p14:creationId xmlns:p14="http://schemas.microsoft.com/office/powerpoint/2010/main" xmlns="" val="989869968"/>
+        <p14:creationId xmlns="" xmlns:p14="http://schemas.microsoft.com/office/powerpoint/2010/main" val="989869968"/>
       </p:ext>
     </p:extLst>
   </p:cSld>
@@ -1272,7 +1272,7 @@
             <a:fld id="{1736D410-BB1B-47BE-81F8-FA61DEEC5942}" type="datetimeFigureOut">
               <a:rPr lang="en-US" smtClean="0"/>
               <a:pPr/>
-              <a:t>2/3/2014</a:t>
+              <a:t>2/16/2014</a:t>
             </a:fld>
             <a:endParaRPr lang="en-US"/>
           </a:p>
@@ -1324,7 +1324,7 @@
     </p:spTree>
     <p:extLst>
       <p:ext uri="{BB962C8B-B14F-4D97-AF65-F5344CB8AC3E}">
-        <p14:creationId xmlns:p14="http://schemas.microsoft.com/office/powerpoint/2010/main" xmlns="" val="1452775338"/>
+        <p14:creationId xmlns="" xmlns:p14="http://schemas.microsoft.com/office/powerpoint/2010/main" val="1452775338"/>
       </p:ext>
     </p:extLst>
   </p:cSld>
@@ -1460,7 +1460,7 @@
             <a:fld id="{1736D410-BB1B-47BE-81F8-FA61DEEC5942}" type="datetimeFigureOut">
               <a:rPr lang="en-US" smtClean="0"/>
               <a:pPr/>
-              <a:t>2/3/2014</a:t>
+              <a:t>2/16/2014</a:t>
             </a:fld>
             <a:endParaRPr lang="en-US"/>
           </a:p>
@@ -1512,7 +1512,7 @@
     </p:spTree>
     <p:extLst>
       <p:ext uri="{BB962C8B-B14F-4D97-AF65-F5344CB8AC3E}">
-        <p14:creationId xmlns:p14="http://schemas.microsoft.com/office/powerpoint/2010/main" xmlns="" val="3894337954"/>
+        <p14:creationId xmlns="" xmlns:p14="http://schemas.microsoft.com/office/powerpoint/2010/main" val="3894337954"/>
       </p:ext>
     </p:extLst>
   </p:cSld>
@@ -1710,7 +1710,7 @@
             <a:fld id="{1736D410-BB1B-47BE-81F8-FA61DEEC5942}" type="datetimeFigureOut">
               <a:rPr lang="en-US" smtClean="0"/>
               <a:pPr/>
-              <a:t>2/3/2014</a:t>
+              <a:t>2/16/2014</a:t>
             </a:fld>
             <a:endParaRPr lang="en-US"/>
           </a:p>
@@ -1762,7 +1762,7 @@
     </p:spTree>
     <p:extLst>
       <p:ext uri="{BB962C8B-B14F-4D97-AF65-F5344CB8AC3E}">
-        <p14:creationId xmlns:p14="http://schemas.microsoft.com/office/powerpoint/2010/main" xmlns="" val="1362160421"/>
+        <p14:creationId xmlns="" xmlns:p14="http://schemas.microsoft.com/office/powerpoint/2010/main" val="1362160421"/>
       </p:ext>
     </p:extLst>
   </p:cSld>
@@ -1898,7 +1898,7 @@
             <a:fld id="{1736D410-BB1B-47BE-81F8-FA61DEEC5942}" type="datetimeFigureOut">
               <a:rPr lang="en-US" smtClean="0"/>
               <a:pPr/>
-              <a:t>2/3/2014</a:t>
+              <a:t>2/16/2014</a:t>
             </a:fld>
             <a:endParaRPr lang="en-US"/>
           </a:p>
@@ -1950,7 +1950,7 @@
     </p:spTree>
     <p:extLst>
       <p:ext uri="{BB962C8B-B14F-4D97-AF65-F5344CB8AC3E}">
-        <p14:creationId xmlns:p14="http://schemas.microsoft.com/office/powerpoint/2010/main" xmlns="" val="1001508708"/>
+        <p14:creationId xmlns="" xmlns:p14="http://schemas.microsoft.com/office/powerpoint/2010/main" val="1001508708"/>
       </p:ext>
     </p:extLst>
   </p:cSld>
@@ -2152,7 +2152,7 @@
             <a:fld id="{1736D410-BB1B-47BE-81F8-FA61DEEC5942}" type="datetimeFigureOut">
               <a:rPr lang="en-US" smtClean="0"/>
               <a:pPr/>
-              <a:t>2/3/2014</a:t>
+              <a:t>2/16/2014</a:t>
             </a:fld>
             <a:endParaRPr lang="en-US"/>
           </a:p>
@@ -2204,7 +2204,7 @@
     </p:spTree>
     <p:extLst>
       <p:ext uri="{BB962C8B-B14F-4D97-AF65-F5344CB8AC3E}">
-        <p14:creationId xmlns:p14="http://schemas.microsoft.com/office/powerpoint/2010/main" xmlns="" val="3465844944"/>
+        <p14:creationId xmlns="" xmlns:p14="http://schemas.microsoft.com/office/powerpoint/2010/main" val="3465844944"/>
       </p:ext>
     </p:extLst>
   </p:cSld>
@@ -2456,7 +2456,7 @@
             <a:fld id="{1736D410-BB1B-47BE-81F8-FA61DEEC5942}" type="datetimeFigureOut">
               <a:rPr lang="en-US" smtClean="0"/>
               <a:pPr/>
-              <a:t>2/3/2014</a:t>
+              <a:t>2/16/2014</a:t>
             </a:fld>
             <a:endParaRPr lang="en-US"/>
           </a:p>
@@ -2508,7 +2508,7 @@
     </p:spTree>
     <p:extLst>
       <p:ext uri="{BB962C8B-B14F-4D97-AF65-F5344CB8AC3E}">
-        <p14:creationId xmlns:p14="http://schemas.microsoft.com/office/powerpoint/2010/main" xmlns="" val="3500538590"/>
+        <p14:creationId xmlns="" xmlns:p14="http://schemas.microsoft.com/office/powerpoint/2010/main" val="3500538590"/>
       </p:ext>
     </p:extLst>
   </p:cSld>
@@ -2900,7 +2900,7 @@
             <a:fld id="{1736D410-BB1B-47BE-81F8-FA61DEEC5942}" type="datetimeFigureOut">
               <a:rPr lang="en-US" smtClean="0"/>
               <a:pPr/>
-              <a:t>2/3/2014</a:t>
+              <a:t>2/16/2014</a:t>
             </a:fld>
             <a:endParaRPr lang="en-US"/>
           </a:p>
@@ -2952,7 +2952,7 @@
     </p:spTree>
     <p:extLst>
       <p:ext uri="{BB962C8B-B14F-4D97-AF65-F5344CB8AC3E}">
-        <p14:creationId xmlns:p14="http://schemas.microsoft.com/office/powerpoint/2010/main" xmlns="" val="1822163244"/>
+        <p14:creationId xmlns="" xmlns:p14="http://schemas.microsoft.com/office/powerpoint/2010/main" val="1822163244"/>
       </p:ext>
     </p:extLst>
   </p:cSld>
@@ -2997,7 +2997,7 @@
             <a:fld id="{1736D410-BB1B-47BE-81F8-FA61DEEC5942}" type="datetimeFigureOut">
               <a:rPr lang="en-US" smtClean="0"/>
               <a:pPr/>
-              <a:t>2/3/2014</a:t>
+              <a:t>2/16/2014</a:t>
             </a:fld>
             <a:endParaRPr lang="en-US"/>
           </a:p>
@@ -3049,7 +3049,7 @@
     </p:spTree>
     <p:extLst>
       <p:ext uri="{BB962C8B-B14F-4D97-AF65-F5344CB8AC3E}">
-        <p14:creationId xmlns:p14="http://schemas.microsoft.com/office/powerpoint/2010/main" xmlns="" val="2405767068"/>
+        <p14:creationId xmlns="" xmlns:p14="http://schemas.microsoft.com/office/powerpoint/2010/main" val="2405767068"/>
       </p:ext>
     </p:extLst>
   </p:cSld>
@@ -3285,7 +3285,7 @@
             <a:fld id="{1736D410-BB1B-47BE-81F8-FA61DEEC5942}" type="datetimeFigureOut">
               <a:rPr lang="en-US" smtClean="0"/>
               <a:pPr/>
-              <a:t>2/3/2014</a:t>
+              <a:t>2/16/2014</a:t>
             </a:fld>
             <a:endParaRPr lang="en-US"/>
           </a:p>
@@ -3337,7 +3337,7 @@
     </p:spTree>
     <p:extLst>
       <p:ext uri="{BB962C8B-B14F-4D97-AF65-F5344CB8AC3E}">
-        <p14:creationId xmlns:p14="http://schemas.microsoft.com/office/powerpoint/2010/main" xmlns="" val="1001517974"/>
+        <p14:creationId xmlns="" xmlns:p14="http://schemas.microsoft.com/office/powerpoint/2010/main" val="1001517974"/>
       </p:ext>
     </p:extLst>
   </p:cSld>
@@ -3549,7 +3549,7 @@
             <a:fld id="{1736D410-BB1B-47BE-81F8-FA61DEEC5942}" type="datetimeFigureOut">
               <a:rPr lang="en-US" smtClean="0"/>
               <a:pPr/>
-              <a:t>2/3/2014</a:t>
+              <a:t>2/16/2014</a:t>
             </a:fld>
             <a:endParaRPr lang="en-US"/>
           </a:p>
@@ -3601,7 +3601,7 @@
     </p:spTree>
     <p:extLst>
       <p:ext uri="{BB962C8B-B14F-4D97-AF65-F5344CB8AC3E}">
-        <p14:creationId xmlns:p14="http://schemas.microsoft.com/office/powerpoint/2010/main" xmlns="" val="1032843098"/>
+        <p14:creationId xmlns="" xmlns:p14="http://schemas.microsoft.com/office/powerpoint/2010/main" val="1032843098"/>
       </p:ext>
     </p:extLst>
   </p:cSld>
@@ -3678,7 +3678,7 @@
             <a:fld id="{1736D410-BB1B-47BE-81F8-FA61DEEC5942}" type="datetimeFigureOut">
               <a:rPr lang="en-US" smtClean="0"/>
               <a:pPr/>
-              <a:t>2/3/2014</a:t>
+              <a:t>2/16/2014</a:t>
             </a:fld>
             <a:endParaRPr lang="en-US"/>
           </a:p>
@@ -3761,7 +3761,7 @@
     </p:spTree>
     <p:extLst>
       <p:ext uri="{BB962C8B-B14F-4D97-AF65-F5344CB8AC3E}">
-        <p14:creationId xmlns:p14="http://schemas.microsoft.com/office/powerpoint/2010/main" xmlns="" val="2425591320"/>
+        <p14:creationId xmlns="" xmlns:p14="http://schemas.microsoft.com/office/powerpoint/2010/main" val="2425591320"/>
       </p:ext>
     </p:extLst>
   </p:cSld>
@@ -4178,7 +4178,7 @@
     </p:spTree>
     <p:extLst>
       <p:ext uri="{BB962C8B-B14F-4D97-AF65-F5344CB8AC3E}">
-        <p14:creationId xmlns:p14="http://schemas.microsoft.com/office/powerpoint/2010/main" xmlns="" val="3983013449"/>
+        <p14:creationId xmlns="" xmlns:p14="http://schemas.microsoft.com/office/powerpoint/2010/main" val="3983013449"/>
       </p:ext>
     </p:extLst>
   </p:cSld>
@@ -7591,14 +7591,21 @@
                 <a:latin typeface="Courier New" pitchFamily="49" charset="0"/>
                 <a:cs typeface="Courier New" pitchFamily="49" charset="0"/>
               </a:rPr>
-              <a:t>env_exists</a:t>
-            </a:r>
-            <a:r>
-              <a:rPr lang="en-GB" b="1" smtClean="0">
-                <a:latin typeface="Courier New" pitchFamily="49" charset="0"/>
-                <a:cs typeface="Courier New" pitchFamily="49" charset="0"/>
-              </a:rPr>
-              <a:t>(cfgEnvVar))</a:t>
+              <a:t>env_has</a:t>
+            </a:r>
+            <a:r>
+              <a:rPr lang="en-GB" b="1" smtClean="0">
+                <a:latin typeface="Courier New" pitchFamily="49" charset="0"/>
+                <a:cs typeface="Courier New" pitchFamily="49" charset="0"/>
+              </a:rPr>
+              <a:t>(cfgEnvVar</a:t>
+            </a:r>
+            <a:r>
+              <a:rPr lang="en-GB" b="1" smtClean="0">
+                <a:latin typeface="Courier New" pitchFamily="49" charset="0"/>
+                <a:cs typeface="Courier New" pitchFamily="49" charset="0"/>
+              </a:rPr>
+              <a:t>))</a:t>
             </a:r>
           </a:p>
           <a:p>

</xml_diff>